<commit_message>
COMP270: Accessibility fixes for week 2 slides
</commit_message>
<xml_diff>
--- a/COMP270/02/2020-21-COMP270-02-lecture-materials-3.pptx
+++ b/COMP270/02/2020-21-COMP270-02-lecture-materials-3.pptx
@@ -254,7 +254,7 @@
           <a:p>
             <a:fld id="{8906F081-8781-4431-8FD4-2CF608CD7C47}" type="datetimeFigureOut">
               <a:rPr lang="en-US" smtClean="0"/>
-              <a:t>8/28/2020</a:t>
+              <a:t>8/29/2020</a:t>
             </a:fld>
             <a:endParaRPr lang="en-US"/>
           </a:p>
@@ -419,7 +419,7 @@
           <a:p>
             <a:fld id="{F06CA47C-B7FD-4BE9-B0E6-81BA758D95F2}" type="datetimeFigureOut">
               <a:rPr lang="en-US" smtClean="0"/>
-              <a:t>8/28/2020</a:t>
+              <a:t>8/29/2020</a:t>
             </a:fld>
             <a:endParaRPr lang="en-US"/>
           </a:p>
@@ -2105,7 +2105,7 @@
           <a:p>
             <a:fld id="{33024136-D290-48F3-A182-4C46BEB5146B}" type="datetime1">
               <a:rPr lang="en-US" smtClean="0"/>
-              <a:t>8/28/2020</a:t>
+              <a:t>8/29/2020</a:t>
             </a:fld>
             <a:endParaRPr lang="en-US" dirty="0"/>
           </a:p>
@@ -2289,7 +2289,7 @@
           <a:p>
             <a:fld id="{9CC7D44C-38B1-4D0F-9006-D5774F331095}" type="datetime1">
               <a:rPr lang="en-US" smtClean="0"/>
-              <a:t>8/28/2020</a:t>
+              <a:t>8/29/2020</a:t>
             </a:fld>
             <a:endParaRPr lang="en-US"/>
           </a:p>
@@ -2483,7 +2483,7 @@
           <a:p>
             <a:fld id="{F98D518A-FD4F-4358-B95B-9DB5A17160FB}" type="datetime1">
               <a:rPr lang="en-US" smtClean="0"/>
-              <a:t>8/28/2020</a:t>
+              <a:t>8/29/2020</a:t>
             </a:fld>
             <a:endParaRPr lang="en-US"/>
           </a:p>
@@ -2676,7 +2676,7 @@
           <a:p>
             <a:fld id="{5E2A9F4F-03AD-4497-A65D-076601BD41D2}" type="datetime1">
               <a:rPr lang="en-US" smtClean="0"/>
-              <a:t>8/28/2020</a:t>
+              <a:t>8/29/2020</a:t>
             </a:fld>
             <a:endParaRPr lang="en-US"/>
           </a:p>
@@ -2899,7 +2899,7 @@
           <a:p>
             <a:fld id="{EDFBF3AC-A781-43AA-8BD5-B12F49168B94}" type="datetime1">
               <a:rPr lang="en-US" smtClean="0"/>
-              <a:t>8/28/2020</a:t>
+              <a:t>8/29/2020</a:t>
             </a:fld>
             <a:endParaRPr lang="en-US"/>
           </a:p>
@@ -3184,7 +3184,7 @@
           <a:p>
             <a:fld id="{C5256A41-C91B-43FF-9881-F5DA9878418F}" type="datetime1">
               <a:rPr lang="en-US" smtClean="0"/>
-              <a:t>8/28/2020</a:t>
+              <a:t>8/29/2020</a:t>
             </a:fld>
             <a:endParaRPr lang="en-US"/>
           </a:p>
@@ -3587,7 +3587,7 @@
           <a:p>
             <a:fld id="{FFD7AA76-41EE-4C13-950E-E611B8B8FC52}" type="datetime1">
               <a:rPr lang="en-US" smtClean="0"/>
-              <a:t>8/28/2020</a:t>
+              <a:t>8/29/2020</a:t>
             </a:fld>
             <a:endParaRPr lang="en-US"/>
           </a:p>
@@ -3734,7 +3734,7 @@
           <a:p>
             <a:fld id="{89407A26-E7BC-4498-97E4-87AF12377CA9}" type="datetime1">
               <a:rPr lang="en-US" smtClean="0"/>
-              <a:t>8/28/2020</a:t>
+              <a:t>8/29/2020</a:t>
             </a:fld>
             <a:endParaRPr lang="en-US"/>
           </a:p>
@@ -3849,7 +3849,7 @@
           <a:p>
             <a:fld id="{93EA4171-1117-4486-993C-35A7470D8847}" type="datetime1">
               <a:rPr lang="en-US" smtClean="0"/>
-              <a:t>8/28/2020</a:t>
+              <a:t>8/29/2020</a:t>
             </a:fld>
             <a:endParaRPr lang="en-US"/>
           </a:p>
@@ -4121,7 +4121,7 @@
           <a:p>
             <a:fld id="{472A4CB8-1563-4663-81DB-74EB416C19BE}" type="datetime1">
               <a:rPr lang="en-US" smtClean="0"/>
-              <a:t>8/28/2020</a:t>
+              <a:t>8/29/2020</a:t>
             </a:fld>
             <a:endParaRPr lang="en-US"/>
           </a:p>
@@ -4457,7 +4457,7 @@
           <a:p>
             <a:fld id="{0C6724CE-2468-448B-87C1-A92EDD78369B}" type="datetime1">
               <a:rPr lang="en-US" smtClean="0"/>
-              <a:t>8/28/2020</a:t>
+              <a:t>8/29/2020</a:t>
             </a:fld>
             <a:endParaRPr lang="en-US"/>
           </a:p>
@@ -4718,7 +4718,7 @@
           <a:p>
             <a:fld id="{4CD11720-76E7-46E6-B0AA-057287C42052}" type="datetime1">
               <a:rPr lang="en-US" smtClean="0"/>
-              <a:t>8/28/2020</a:t>
+              <a:t>8/29/2020</a:t>
             </a:fld>
             <a:endParaRPr lang="en-US" dirty="0"/>
           </a:p>
@@ -8010,6 +8010,9 @@
               <a:ext uri="{FF2B5EF4-FFF2-40B4-BE49-F238E27FC236}">
                 <a16:creationId xmlns:a16="http://schemas.microsoft.com/office/drawing/2014/main" id="{9C5BBF29-908D-4749-9FF2-94F18B5AB0B9}"/>
               </a:ext>
+              <a:ext uri="{C183D7F6-B498-43B3-948B-1728B52AA6E4}">
+                <adec:decorative xmlns:adec="http://schemas.microsoft.com/office/drawing/2017/decorative" val="1"/>
+              </a:ext>
             </a:extLst>
           </p:cNvPr>
           <p:cNvCxnSpPr>
@@ -8330,6 +8333,9 @@
               <a:ext uri="{FF2B5EF4-FFF2-40B4-BE49-F238E27FC236}">
                 <a16:creationId xmlns:a16="http://schemas.microsoft.com/office/drawing/2014/main" id="{D6199B4F-A065-456D-A7DD-8E48EE86F49D}"/>
               </a:ext>
+              <a:ext uri="{C183D7F6-B498-43B3-948B-1728B52AA6E4}">
+                <adec:decorative xmlns:adec="http://schemas.microsoft.com/office/drawing/2017/decorative" val="1"/>
+              </a:ext>
             </a:extLst>
           </p:cNvPr>
           <p:cNvGrpSpPr/>
@@ -8349,6 +8355,9 @@
               <a:extLst>
                 <a:ext uri="{FF2B5EF4-FFF2-40B4-BE49-F238E27FC236}">
                   <a16:creationId xmlns:a16="http://schemas.microsoft.com/office/drawing/2014/main" id="{BE0B8547-7075-41D1-A579-B6D4E2828E3C}"/>
+                </a:ext>
+                <a:ext uri="{C183D7F6-B498-43B3-948B-1728B52AA6E4}">
+                  <adec:decorative xmlns:adec="http://schemas.microsoft.com/office/drawing/2017/decorative" val="1"/>
                 </a:ext>
               </a:extLst>
             </p:cNvPr>
@@ -8395,6 +8404,9 @@
               <a:extLst>
                 <a:ext uri="{FF2B5EF4-FFF2-40B4-BE49-F238E27FC236}">
                   <a16:creationId xmlns:a16="http://schemas.microsoft.com/office/drawing/2014/main" id="{206D88F4-21FE-4C04-AF0A-BF3F365C5312}"/>
+                </a:ext>
+                <a:ext uri="{C183D7F6-B498-43B3-948B-1728B52AA6E4}">
+                  <adec:decorative xmlns:adec="http://schemas.microsoft.com/office/drawing/2017/decorative" val="1"/>
                 </a:ext>
               </a:extLst>
             </p:cNvPr>
@@ -12258,6 +12270,9 @@
               <a:ext uri="{FF2B5EF4-FFF2-40B4-BE49-F238E27FC236}">
                 <a16:creationId xmlns:a16="http://schemas.microsoft.com/office/drawing/2014/main" id="{5D74C139-A8FE-42C5-96C6-9DBF5DB28F79}"/>
               </a:ext>
+              <a:ext uri="{C183D7F6-B498-43B3-948B-1728B52AA6E4}">
+                <adec:decorative xmlns:adec="http://schemas.microsoft.com/office/drawing/2017/decorative" val="1"/>
+              </a:ext>
             </a:extLst>
           </p:cNvPr>
           <p:cNvGrpSpPr/>
@@ -12277,6 +12292,9 @@
               <a:extLst>
                 <a:ext uri="{FF2B5EF4-FFF2-40B4-BE49-F238E27FC236}">
                   <a16:creationId xmlns:a16="http://schemas.microsoft.com/office/drawing/2014/main" id="{084CC132-A920-411E-BBBE-C505E6388877}"/>
+                </a:ext>
+                <a:ext uri="{C183D7F6-B498-43B3-948B-1728B52AA6E4}">
+                  <adec:decorative xmlns:adec="http://schemas.microsoft.com/office/drawing/2017/decorative" val="1"/>
                 </a:ext>
               </a:extLst>
             </p:cNvPr>
@@ -12323,6 +12341,9 @@
               <a:extLst>
                 <a:ext uri="{FF2B5EF4-FFF2-40B4-BE49-F238E27FC236}">
                   <a16:creationId xmlns:a16="http://schemas.microsoft.com/office/drawing/2014/main" id="{47069E62-360E-4222-8458-6CB84158C39A}"/>
+                </a:ext>
+                <a:ext uri="{C183D7F6-B498-43B3-948B-1728B52AA6E4}">
+                  <adec:decorative xmlns:adec="http://schemas.microsoft.com/office/drawing/2017/decorative" val="1"/>
                 </a:ext>
               </a:extLst>
             </p:cNvPr>
@@ -12465,6 +12486,9 @@
               <a:extLst>
                 <a:ext uri="{FF2B5EF4-FFF2-40B4-BE49-F238E27FC236}">
                   <a16:creationId xmlns:a16="http://schemas.microsoft.com/office/drawing/2014/main" id="{C238A48D-FA6E-4549-89AB-D3F8D926BBB6}"/>
+                </a:ext>
+                <a:ext uri="{C183D7F6-B498-43B3-948B-1728B52AA6E4}">
+                  <adec:decorative xmlns:adec="http://schemas.microsoft.com/office/drawing/2017/decorative" val="1"/>
                 </a:ext>
               </a:extLst>
             </p:cNvPr>
@@ -14467,8 +14491,8 @@
           </a:p>
         </p:txBody>
       </p:sp>
-      <mc:AlternateContent xmlns:mc="http://schemas.openxmlformats.org/markup-compatibility/2006">
-        <mc:Choice xmlns:a14="http://schemas.microsoft.com/office/drawing/2010/main" Requires="a14">
+      <mc:AlternateContent xmlns:mc="http://schemas.openxmlformats.org/markup-compatibility/2006" xmlns:a14="http://schemas.microsoft.com/office/drawing/2010/main">
+        <mc:Choice Requires="a14">
           <p:sp>
             <p:nvSpPr>
               <p:cNvPr id="5" name="Content Placeholder 4">
@@ -14599,7 +14623,7 @@
             </p:txBody>
           </p:sp>
         </mc:Choice>
-        <mc:Fallback>
+        <mc:Fallback xmlns="">
           <p:sp>
             <p:nvSpPr>
               <p:cNvPr id="5" name="Content Placeholder 4">
@@ -15779,8 +15803,8 @@
           </a:p>
         </p:txBody>
       </p:sp>
-      <mc:AlternateContent xmlns:mc="http://schemas.openxmlformats.org/markup-compatibility/2006">
-        <mc:Choice xmlns:a14="http://schemas.microsoft.com/office/drawing/2010/main" Requires="a14">
+      <mc:AlternateContent xmlns:mc="http://schemas.openxmlformats.org/markup-compatibility/2006" xmlns:a14="http://schemas.microsoft.com/office/drawing/2010/main">
+        <mc:Choice Requires="a14">
           <p:sp>
             <p:nvSpPr>
               <p:cNvPr id="3" name="Content Placeholder 2">
@@ -15905,7 +15929,7 @@
             </p:txBody>
           </p:sp>
         </mc:Choice>
-        <mc:Fallback>
+        <mc:Fallback xmlns="">
           <p:sp>
             <p:nvSpPr>
               <p:cNvPr id="3" name="Content Placeholder 2">

</xml_diff>